<commit_message>
help link and date for upload
</commit_message>
<xml_diff>
--- a/docs/VDJ User Manual Images.pptx
+++ b/docs/VDJ User Manual Images.pptx
@@ -571,7 +571,7 @@
           <a:p>
             <a:fld id="{9885E586-6A96-4D07-ACD4-1C1BB9A93CCD}" type="datetimeFigureOut">
               <a:rPr lang="en-US" smtClean="0"/>
-              <a:t>9/6/2024</a:t>
+              <a:t>9/20/2024</a:t>
             </a:fld>
             <a:endParaRPr lang="en-US"/>
           </a:p>
@@ -769,7 +769,7 @@
           <a:p>
             <a:fld id="{9885E586-6A96-4D07-ACD4-1C1BB9A93CCD}" type="datetimeFigureOut">
               <a:rPr lang="en-US" smtClean="0"/>
-              <a:t>9/6/2024</a:t>
+              <a:t>9/20/2024</a:t>
             </a:fld>
             <a:endParaRPr lang="en-US"/>
           </a:p>
@@ -977,7 +977,7 @@
           <a:p>
             <a:fld id="{9885E586-6A96-4D07-ACD4-1C1BB9A93CCD}" type="datetimeFigureOut">
               <a:rPr lang="en-US" smtClean="0"/>
-              <a:t>9/6/2024</a:t>
+              <a:t>9/20/2024</a:t>
             </a:fld>
             <a:endParaRPr lang="en-US"/>
           </a:p>
@@ -1175,7 +1175,7 @@
           <a:p>
             <a:fld id="{9885E586-6A96-4D07-ACD4-1C1BB9A93CCD}" type="datetimeFigureOut">
               <a:rPr lang="en-US" smtClean="0"/>
-              <a:t>9/6/2024</a:t>
+              <a:t>9/20/2024</a:t>
             </a:fld>
             <a:endParaRPr lang="en-US"/>
           </a:p>
@@ -1450,7 +1450,7 @@
           <a:p>
             <a:fld id="{9885E586-6A96-4D07-ACD4-1C1BB9A93CCD}" type="datetimeFigureOut">
               <a:rPr lang="en-US" smtClean="0"/>
-              <a:t>9/6/2024</a:t>
+              <a:t>9/20/2024</a:t>
             </a:fld>
             <a:endParaRPr lang="en-US"/>
           </a:p>
@@ -1715,7 +1715,7 @@
           <a:p>
             <a:fld id="{9885E586-6A96-4D07-ACD4-1C1BB9A93CCD}" type="datetimeFigureOut">
               <a:rPr lang="en-US" smtClean="0"/>
-              <a:t>9/6/2024</a:t>
+              <a:t>9/20/2024</a:t>
             </a:fld>
             <a:endParaRPr lang="en-US"/>
           </a:p>
@@ -2127,7 +2127,7 @@
           <a:p>
             <a:fld id="{9885E586-6A96-4D07-ACD4-1C1BB9A93CCD}" type="datetimeFigureOut">
               <a:rPr lang="en-US" smtClean="0"/>
-              <a:t>9/6/2024</a:t>
+              <a:t>9/20/2024</a:t>
             </a:fld>
             <a:endParaRPr lang="en-US"/>
           </a:p>
@@ -2268,7 +2268,7 @@
           <a:p>
             <a:fld id="{9885E586-6A96-4D07-ACD4-1C1BB9A93CCD}" type="datetimeFigureOut">
               <a:rPr lang="en-US" smtClean="0"/>
-              <a:t>9/6/2024</a:t>
+              <a:t>9/20/2024</a:t>
             </a:fld>
             <a:endParaRPr lang="en-US"/>
           </a:p>
@@ -2381,7 +2381,7 @@
           <a:p>
             <a:fld id="{9885E586-6A96-4D07-ACD4-1C1BB9A93CCD}" type="datetimeFigureOut">
               <a:rPr lang="en-US" smtClean="0"/>
-              <a:t>9/6/2024</a:t>
+              <a:t>9/20/2024</a:t>
             </a:fld>
             <a:endParaRPr lang="en-US"/>
           </a:p>
@@ -2692,7 +2692,7 @@
           <a:p>
             <a:fld id="{9885E586-6A96-4D07-ACD4-1C1BB9A93CCD}" type="datetimeFigureOut">
               <a:rPr lang="en-US" smtClean="0"/>
-              <a:t>9/6/2024</a:t>
+              <a:t>9/20/2024</a:t>
             </a:fld>
             <a:endParaRPr lang="en-US"/>
           </a:p>
@@ -2980,7 +2980,7 @@
           <a:p>
             <a:fld id="{9885E586-6A96-4D07-ACD4-1C1BB9A93CCD}" type="datetimeFigureOut">
               <a:rPr lang="en-US" smtClean="0"/>
-              <a:t>9/6/2024</a:t>
+              <a:t>9/20/2024</a:t>
             </a:fld>
             <a:endParaRPr lang="en-US"/>
           </a:p>
@@ -3221,7 +3221,7 @@
           <a:p>
             <a:fld id="{9885E586-6A96-4D07-ACD4-1C1BB9A93CCD}" type="datetimeFigureOut">
               <a:rPr lang="en-US" smtClean="0"/>
-              <a:t>9/6/2024</a:t>
+              <a:t>9/20/2024</a:t>
             </a:fld>
             <a:endParaRPr lang="en-US"/>
           </a:p>
@@ -3640,10 +3640,10 @@
       </p:grpSpPr>
       <p:pic>
         <p:nvPicPr>
-          <p:cNvPr id="10" name="Picture 9">
-            <a:extLst>
-              <a:ext uri="{FF2B5EF4-FFF2-40B4-BE49-F238E27FC236}">
-                <a16:creationId xmlns:a16="http://schemas.microsoft.com/office/drawing/2014/main" id="{63DDB790-F4A1-F8AC-9433-5198C88BF243}"/>
+          <p:cNvPr id="3" name="Picture 2">
+            <a:extLst>
+              <a:ext uri="{FF2B5EF4-FFF2-40B4-BE49-F238E27FC236}">
+                <a16:creationId xmlns:a16="http://schemas.microsoft.com/office/drawing/2014/main" id="{5A22F976-D686-132D-4D47-788883484AB1}"/>
               </a:ext>
             </a:extLst>
           </p:cNvPr>
@@ -3660,8 +3660,8 @@
         </p:blipFill>
         <p:spPr>
           <a:xfrm>
-            <a:off x="2003901" y="984153"/>
-            <a:ext cx="7511412" cy="4559397"/>
+            <a:off x="2094479" y="880109"/>
+            <a:ext cx="8003042" cy="5097782"/>
           </a:xfrm>
           <a:prstGeom prst="rect">
             <a:avLst/>
@@ -3743,7 +3743,7 @@
         </p:nvSpPr>
         <p:spPr>
           <a:xfrm>
-            <a:off x="3234690" y="3592830"/>
+            <a:off x="3145317" y="3101340"/>
             <a:ext cx="491490" cy="491490"/>
           </a:xfrm>
           <a:prstGeom prst="ellipse">
@@ -3804,7 +3804,7 @@
         </p:nvSpPr>
         <p:spPr>
           <a:xfrm>
-            <a:off x="2653827" y="4511040"/>
+            <a:off x="2802417" y="4048125"/>
             <a:ext cx="491490" cy="491490"/>
           </a:xfrm>
           <a:prstGeom prst="ellipse">
@@ -3865,7 +3865,7 @@
         </p:nvSpPr>
         <p:spPr>
           <a:xfrm>
-            <a:off x="6884670" y="3347085"/>
+            <a:off x="6608084" y="2937510"/>
             <a:ext cx="491490" cy="491490"/>
           </a:xfrm>
           <a:prstGeom prst="ellipse">
@@ -4187,10 +4187,10 @@
       </p:grpSpPr>
       <p:pic>
         <p:nvPicPr>
-          <p:cNvPr id="3" name="Picture 2">
-            <a:extLst>
-              <a:ext uri="{FF2B5EF4-FFF2-40B4-BE49-F238E27FC236}">
-                <a16:creationId xmlns:a16="http://schemas.microsoft.com/office/drawing/2014/main" id="{83EA75A4-B7C7-D2AC-B3A8-592620079C17}"/>
+          <p:cNvPr id="9" name="Picture 8">
+            <a:extLst>
+              <a:ext uri="{FF2B5EF4-FFF2-40B4-BE49-F238E27FC236}">
+                <a16:creationId xmlns:a16="http://schemas.microsoft.com/office/drawing/2014/main" id="{30B34952-47AB-6B3C-F47F-34F832625648}"/>
               </a:ext>
             </a:extLst>
           </p:cNvPr>
@@ -4207,8 +4207,8 @@
         </p:blipFill>
         <p:spPr>
           <a:xfrm>
-            <a:off x="1793654" y="1317516"/>
-            <a:ext cx="8604692" cy="4222967"/>
+            <a:off x="1653327" y="891539"/>
+            <a:ext cx="8885346" cy="5074922"/>
           </a:xfrm>
           <a:prstGeom prst="rect">
             <a:avLst/>
@@ -4229,7 +4229,7 @@
         </p:nvSpPr>
         <p:spPr>
           <a:xfrm>
-            <a:off x="4680585" y="2548890"/>
+            <a:off x="5000625" y="2217420"/>
             <a:ext cx="491490" cy="491490"/>
           </a:xfrm>
           <a:prstGeom prst="ellipse">
@@ -4290,7 +4290,7 @@
         </p:nvSpPr>
         <p:spPr>
           <a:xfrm>
-            <a:off x="3091815" y="3851910"/>
+            <a:off x="3114675" y="4263390"/>
             <a:ext cx="491490" cy="491490"/>
           </a:xfrm>
           <a:prstGeom prst="ellipse">
@@ -4351,7 +4351,7 @@
         </p:nvSpPr>
         <p:spPr>
           <a:xfrm>
-            <a:off x="4244340" y="4606290"/>
+            <a:off x="5850255" y="3891915"/>
             <a:ext cx="491490" cy="491490"/>
           </a:xfrm>
           <a:prstGeom prst="ellipse">
@@ -4394,6 +4394,67 @@
                 </a:solidFill>
               </a:rPr>
               <a:t>3</a:t>
+            </a:r>
+          </a:p>
+        </p:txBody>
+      </p:sp>
+      <p:sp>
+        <p:nvSpPr>
+          <p:cNvPr id="10" name="Oval 9">
+            <a:extLst>
+              <a:ext uri="{FF2B5EF4-FFF2-40B4-BE49-F238E27FC236}">
+                <a16:creationId xmlns:a16="http://schemas.microsoft.com/office/drawing/2014/main" id="{CAE7BEE2-9138-C163-2BE3-D4E353410264}"/>
+              </a:ext>
+            </a:extLst>
+          </p:cNvPr>
+          <p:cNvSpPr/>
+          <p:nvPr/>
+        </p:nvSpPr>
+        <p:spPr>
+          <a:xfrm>
+            <a:off x="4352925" y="4941570"/>
+            <a:ext cx="491490" cy="491490"/>
+          </a:xfrm>
+          <a:prstGeom prst="ellipse">
+            <a:avLst/>
+          </a:prstGeom>
+          <a:solidFill>
+            <a:srgbClr val="FFFF00"/>
+          </a:solidFill>
+          <a:ln>
+            <a:solidFill>
+              <a:schemeClr val="tx1"/>
+            </a:solidFill>
+          </a:ln>
+        </p:spPr>
+        <p:style>
+          <a:lnRef idx="2">
+            <a:schemeClr val="accent1">
+              <a:shade val="15000"/>
+            </a:schemeClr>
+          </a:lnRef>
+          <a:fillRef idx="1">
+            <a:schemeClr val="accent1"/>
+          </a:fillRef>
+          <a:effectRef idx="0">
+            <a:schemeClr val="accent1"/>
+          </a:effectRef>
+          <a:fontRef idx="minor">
+            <a:schemeClr val="lt1"/>
+          </a:fontRef>
+        </p:style>
+        <p:txBody>
+          <a:bodyPr rtlCol="0" anchor="ctr"/>
+          <a:lstStyle/>
+          <a:p>
+            <a:pPr algn="ctr"/>
+            <a:r>
+              <a:rPr lang="en-US" b="1" dirty="0">
+                <a:solidFill>
+                  <a:schemeClr val="tx1"/>
+                </a:solidFill>
+              </a:rPr>
+              <a:t>4</a:t>
             </a:r>
           </a:p>
         </p:txBody>

</xml_diff>